<commit_message>
add word embedding notebook
</commit_message>
<xml_diff>
--- a/part-1/Introduction.pptx
+++ b/part-1/Introduction.pptx
@@ -5,14 +5,16 @@
     <p:sldMasterId id="2147483648" r:id="rId1"/>
   </p:sldMasterIdLst>
   <p:notesMasterIdLst>
-    <p:notesMasterId r:id="rId7"/>
+    <p:notesMasterId r:id="rId9"/>
   </p:notesMasterIdLst>
   <p:sldIdLst>
     <p:sldId id="455" r:id="rId2"/>
-    <p:sldId id="498" r:id="rId3"/>
-    <p:sldId id="499" r:id="rId4"/>
-    <p:sldId id="500" r:id="rId5"/>
-    <p:sldId id="501" r:id="rId6"/>
+    <p:sldId id="456" r:id="rId3"/>
+    <p:sldId id="459" r:id="rId4"/>
+    <p:sldId id="458" r:id="rId5"/>
+    <p:sldId id="460" r:id="rId6"/>
+    <p:sldId id="461" r:id="rId7"/>
+    <p:sldId id="462" r:id="rId8"/>
   </p:sldIdLst>
   <p:sldSz cx="12192000" cy="6858000"/>
   <p:notesSz cx="6858000" cy="9144000"/>
@@ -175,20 +177,58 @@
     </pc:docChg>
   </pc:docChgLst>
   <pc:docChgLst>
-    <pc:chgData name="Mohammed Fasha" userId="cc64f42d-a1a6-4f08-b97b-0c37f877119f" providerId="ADAL" clId="{BDE98590-4A1E-4E73-B11E-EFF0D9E423BA}"/>
-    <pc:docChg chg="custSel addSld modSld">
-      <pc:chgData name="Mohammed Fasha" userId="cc64f42d-a1a6-4f08-b97b-0c37f877119f" providerId="ADAL" clId="{BDE98590-4A1E-4E73-B11E-EFF0D9E423BA}" dt="2024-06-06T11:26:37.549" v="341" actId="20577"/>
+    <pc:chgData name="Mohammed Fasha" userId="cc64f42d-a1a6-4f08-b97b-0c37f877119f" providerId="ADAL" clId="{77FC6523-4817-446C-9BC9-1C2BFBBFCCF3}"/>
+    <pc:docChg chg="undo redo custSel addSld delSld modSld">
+      <pc:chgData name="Mohammed Fasha" userId="cc64f42d-a1a6-4f08-b97b-0c37f877119f" providerId="ADAL" clId="{77FC6523-4817-446C-9BC9-1C2BFBBFCCF3}" dt="2024-08-01T17:55:13.823" v="47" actId="27636"/>
       <pc:docMkLst>
         <pc:docMk/>
       </pc:docMkLst>
+      <pc:sldChg chg="modSp mod addAnim delAnim modAnim">
+        <pc:chgData name="Mohammed Fasha" userId="cc64f42d-a1a6-4f08-b97b-0c37f877119f" providerId="ADAL" clId="{77FC6523-4817-446C-9BC9-1C2BFBBFCCF3}" dt="2024-08-01T17:25:41.451" v="44" actId="20577"/>
+        <pc:sldMkLst>
+          <pc:docMk/>
+          <pc:sldMk cId="0" sldId="314"/>
+        </pc:sldMkLst>
+        <pc:spChg chg="mod">
+          <ac:chgData name="Mohammed Fasha" userId="cc64f42d-a1a6-4f08-b97b-0c37f877119f" providerId="ADAL" clId="{77FC6523-4817-446C-9BC9-1C2BFBBFCCF3}" dt="2024-08-01T17:25:41.451" v="44" actId="20577"/>
+          <ac:spMkLst>
+            <pc:docMk/>
+            <pc:sldMk cId="0" sldId="314"/>
+            <ac:spMk id="4" creationId="{BA94330F-87D3-D59A-DDC7-1C7D3D7F1088}"/>
+          </ac:spMkLst>
+        </pc:spChg>
+        <pc:spChg chg="mod">
+          <ac:chgData name="Mohammed Fasha" userId="cc64f42d-a1a6-4f08-b97b-0c37f877119f" providerId="ADAL" clId="{77FC6523-4817-446C-9BC9-1C2BFBBFCCF3}" dt="2024-08-01T17:24:21.461" v="30" actId="20577"/>
+          <ac:spMkLst>
+            <pc:docMk/>
+            <pc:sldMk cId="0" sldId="314"/>
+            <ac:spMk id="697" creationId="{00000000-0000-0000-0000-000000000000}"/>
+          </ac:spMkLst>
+        </pc:spChg>
+      </pc:sldChg>
       <pc:sldChg chg="modSp mod">
-        <pc:chgData name="Mohammed Fasha" userId="cc64f42d-a1a6-4f08-b97b-0c37f877119f" providerId="ADAL" clId="{BDE98590-4A1E-4E73-B11E-EFF0D9E423BA}" dt="2024-06-06T11:26:37.549" v="341" actId="20577"/>
+        <pc:chgData name="Mohammed Fasha" userId="cc64f42d-a1a6-4f08-b97b-0c37f877119f" providerId="ADAL" clId="{77FC6523-4817-446C-9BC9-1C2BFBBFCCF3}" dt="2024-08-01T15:57:21.230" v="17" actId="14100"/>
+        <pc:sldMkLst>
+          <pc:docMk/>
+          <pc:sldMk cId="3601872685" sldId="382"/>
+        </pc:sldMkLst>
+        <pc:spChg chg="mod">
+          <ac:chgData name="Mohammed Fasha" userId="cc64f42d-a1a6-4f08-b97b-0c37f877119f" providerId="ADAL" clId="{77FC6523-4817-446C-9BC9-1C2BFBBFCCF3}" dt="2024-08-01T15:57:21.230" v="17" actId="14100"/>
+          <ac:spMkLst>
+            <pc:docMk/>
+            <pc:sldMk cId="3601872685" sldId="382"/>
+            <ac:spMk id="3" creationId="{77EB58A6-2F03-515D-C718-52C20ECDCE80}"/>
+          </ac:spMkLst>
+        </pc:spChg>
+      </pc:sldChg>
+      <pc:sldChg chg="modSp mod">
+        <pc:chgData name="Mohammed Fasha" userId="cc64f42d-a1a6-4f08-b97b-0c37f877119f" providerId="ADAL" clId="{77FC6523-4817-446C-9BC9-1C2BFBBFCCF3}" dt="2024-08-01T14:14:13.157" v="16" actId="108"/>
         <pc:sldMkLst>
           <pc:docMk/>
           <pc:sldMk cId="2976191511" sldId="393"/>
         </pc:sldMkLst>
         <pc:spChg chg="mod">
-          <ac:chgData name="Mohammed Fasha" userId="cc64f42d-a1a6-4f08-b97b-0c37f877119f" providerId="ADAL" clId="{BDE98590-4A1E-4E73-B11E-EFF0D9E423BA}" dt="2024-06-06T11:26:37.549" v="341" actId="20577"/>
+          <ac:chgData name="Mohammed Fasha" userId="cc64f42d-a1a6-4f08-b97b-0c37f877119f" providerId="ADAL" clId="{77FC6523-4817-446C-9BC9-1C2BFBBFCCF3}" dt="2024-08-01T14:14:13.157" v="16" actId="108"/>
           <ac:spMkLst>
             <pc:docMk/>
             <pc:sldMk cId="2976191511" sldId="393"/>
@@ -196,36 +236,117 @@
           </ac:spMkLst>
         </pc:spChg>
       </pc:sldChg>
-      <pc:sldChg chg="addSp delSp modSp new mod modClrScheme chgLayout">
-        <pc:chgData name="Mohammed Fasha" userId="cc64f42d-a1a6-4f08-b97b-0c37f877119f" providerId="ADAL" clId="{BDE98590-4A1E-4E73-B11E-EFF0D9E423BA}" dt="2024-05-18T14:50:18.046" v="6" actId="1076"/>
+      <pc:sldChg chg="modSp mod">
+        <pc:chgData name="Mohammed Fasha" userId="cc64f42d-a1a6-4f08-b97b-0c37f877119f" providerId="ADAL" clId="{77FC6523-4817-446C-9BC9-1C2BFBBFCCF3}" dt="2024-08-01T17:19:54.193" v="22" actId="368"/>
         <pc:sldMkLst>
           <pc:docMk/>
-          <pc:sldMk cId="1501311303" sldId="496"/>
+          <pc:sldMk cId="430192280" sldId="409"/>
         </pc:sldMkLst>
-        <pc:spChg chg="del">
-          <ac:chgData name="Mohammed Fasha" userId="cc64f42d-a1a6-4f08-b97b-0c37f877119f" providerId="ADAL" clId="{BDE98590-4A1E-4E73-B11E-EFF0D9E423BA}" dt="2024-05-18T14:50:10.938" v="2" actId="700"/>
+        <pc:graphicFrameChg chg="mod modGraphic">
+          <ac:chgData name="Mohammed Fasha" userId="cc64f42d-a1a6-4f08-b97b-0c37f877119f" providerId="ADAL" clId="{77FC6523-4817-446C-9BC9-1C2BFBBFCCF3}" dt="2024-08-01T17:19:54.193" v="22" actId="368"/>
+          <ac:graphicFrameMkLst>
+            <pc:docMk/>
+            <pc:sldMk cId="430192280" sldId="409"/>
+            <ac:graphicFrameMk id="9" creationId="{9DEE3332-499A-311D-04F4-37830CAB9068}"/>
+          </ac:graphicFrameMkLst>
+        </pc:graphicFrameChg>
+      </pc:sldChg>
+      <pc:sldChg chg="modSp mod">
+        <pc:chgData name="Mohammed Fasha" userId="cc64f42d-a1a6-4f08-b97b-0c37f877119f" providerId="ADAL" clId="{77FC6523-4817-446C-9BC9-1C2BFBBFCCF3}" dt="2024-08-01T17:31:03.307" v="45" actId="14100"/>
+        <pc:sldMkLst>
+          <pc:docMk/>
+          <pc:sldMk cId="465427976" sldId="414"/>
+        </pc:sldMkLst>
+        <pc:spChg chg="mod">
+          <ac:chgData name="Mohammed Fasha" userId="cc64f42d-a1a6-4f08-b97b-0c37f877119f" providerId="ADAL" clId="{77FC6523-4817-446C-9BC9-1C2BFBBFCCF3}" dt="2024-08-01T17:31:03.307" v="45" actId="14100"/>
           <ac:spMkLst>
             <pc:docMk/>
-            <pc:sldMk cId="1501311303" sldId="496"/>
-            <ac:spMk id="2" creationId="{D2CEE17A-DDA4-0B5C-B50D-889970C3AE9A}"/>
+            <pc:sldMk cId="465427976" sldId="414"/>
+            <ac:spMk id="3" creationId="{D9658A8B-F579-1261-700D-9D318271C09F}"/>
           </ac:spMkLst>
         </pc:spChg>
-        <pc:spChg chg="del">
-          <ac:chgData name="Mohammed Fasha" userId="cc64f42d-a1a6-4f08-b97b-0c37f877119f" providerId="ADAL" clId="{BDE98590-4A1E-4E73-B11E-EFF0D9E423BA}" dt="2024-05-18T14:50:05.577" v="1"/>
+      </pc:sldChg>
+      <pc:sldChg chg="modSp mod">
+        <pc:chgData name="Mohammed Fasha" userId="cc64f42d-a1a6-4f08-b97b-0c37f877119f" providerId="ADAL" clId="{77FC6523-4817-446C-9BC9-1C2BFBBFCCF3}" dt="2024-08-01T17:20:06.764" v="26"/>
+        <pc:sldMkLst>
+          <pc:docMk/>
+          <pc:sldMk cId="707737036" sldId="425"/>
+        </pc:sldMkLst>
+        <pc:graphicFrameChg chg="mod modGraphic">
+          <ac:chgData name="Mohammed Fasha" userId="cc64f42d-a1a6-4f08-b97b-0c37f877119f" providerId="ADAL" clId="{77FC6523-4817-446C-9BC9-1C2BFBBFCCF3}" dt="2024-08-01T17:20:06.764" v="26"/>
+          <ac:graphicFrameMkLst>
+            <pc:docMk/>
+            <pc:sldMk cId="707737036" sldId="425"/>
+            <ac:graphicFrameMk id="9" creationId="{9DEE3332-499A-311D-04F4-37830CAB9068}"/>
+          </ac:graphicFrameMkLst>
+        </pc:graphicFrameChg>
+      </pc:sldChg>
+      <pc:sldChg chg="modSp mod">
+        <pc:chgData name="Mohammed Fasha" userId="cc64f42d-a1a6-4f08-b97b-0c37f877119f" providerId="ADAL" clId="{77FC6523-4817-446C-9BC9-1C2BFBBFCCF3}" dt="2024-08-01T14:12:43.227" v="9" actId="20577"/>
+        <pc:sldMkLst>
+          <pc:docMk/>
+          <pc:sldMk cId="1932795151" sldId="448"/>
+        </pc:sldMkLst>
+        <pc:spChg chg="mod">
+          <ac:chgData name="Mohammed Fasha" userId="cc64f42d-a1a6-4f08-b97b-0c37f877119f" providerId="ADAL" clId="{77FC6523-4817-446C-9BC9-1C2BFBBFCCF3}" dt="2024-08-01T14:12:43.227" v="9" actId="20577"/>
           <ac:spMkLst>
             <pc:docMk/>
-            <pc:sldMk cId="1501311303" sldId="496"/>
-            <ac:spMk id="3" creationId="{E4FD7E05-4330-DB34-2C71-CB36AF65F804}"/>
+            <pc:sldMk cId="1932795151" sldId="448"/>
+            <ac:spMk id="3" creationId="{A8F66757-FC39-022C-4F62-C5EAEB601945}"/>
           </ac:spMkLst>
         </pc:spChg>
-        <pc:picChg chg="add mod ord">
-          <ac:chgData name="Mohammed Fasha" userId="cc64f42d-a1a6-4f08-b97b-0c37f877119f" providerId="ADAL" clId="{BDE98590-4A1E-4E73-B11E-EFF0D9E423BA}" dt="2024-05-18T14:50:18.046" v="6" actId="1076"/>
-          <ac:picMkLst>
+      </pc:sldChg>
+      <pc:sldChg chg="modSp mod">
+        <pc:chgData name="Mohammed Fasha" userId="cc64f42d-a1a6-4f08-b97b-0c37f877119f" providerId="ADAL" clId="{77FC6523-4817-446C-9BC9-1C2BFBBFCCF3}" dt="2024-08-01T17:55:13.823" v="47" actId="27636"/>
+        <pc:sldMkLst>
+          <pc:docMk/>
+          <pc:sldMk cId="673932695" sldId="492"/>
+        </pc:sldMkLst>
+        <pc:spChg chg="mod">
+          <ac:chgData name="Mohammed Fasha" userId="cc64f42d-a1a6-4f08-b97b-0c37f877119f" providerId="ADAL" clId="{77FC6523-4817-446C-9BC9-1C2BFBBFCCF3}" dt="2024-08-01T17:55:13.823" v="47" actId="27636"/>
+          <ac:spMkLst>
             <pc:docMk/>
-            <pc:sldMk cId="1501311303" sldId="496"/>
-            <ac:picMk id="4" creationId="{F876EE48-736B-0B05-3579-CE389267CB37}"/>
-          </ac:picMkLst>
-        </pc:picChg>
+            <pc:sldMk cId="673932695" sldId="492"/>
+            <ac:spMk id="9" creationId="{07B00AAE-435B-F125-45F0-2514F51DC8D1}"/>
+          </ac:spMkLst>
+        </pc:spChg>
+      </pc:sldChg>
+      <pc:sldChg chg="modSp mod">
+        <pc:chgData name="Mohammed Fasha" userId="cc64f42d-a1a6-4f08-b97b-0c37f877119f" providerId="ADAL" clId="{77FC6523-4817-446C-9BC9-1C2BFBBFCCF3}" dt="2024-08-01T15:57:54.799" v="18" actId="207"/>
+        <pc:sldMkLst>
+          <pc:docMk/>
+          <pc:sldMk cId="2512069021" sldId="493"/>
+        </pc:sldMkLst>
+        <pc:spChg chg="mod">
+          <ac:chgData name="Mohammed Fasha" userId="cc64f42d-a1a6-4f08-b97b-0c37f877119f" providerId="ADAL" clId="{77FC6523-4817-446C-9BC9-1C2BFBBFCCF3}" dt="2024-08-01T15:57:54.799" v="18" actId="207"/>
+          <ac:spMkLst>
+            <pc:docMk/>
+            <pc:sldMk cId="2512069021" sldId="493"/>
+            <ac:spMk id="2" creationId="{DE8DB31A-FBF2-693E-DC7B-90969B148559}"/>
+          </ac:spMkLst>
+        </pc:spChg>
+      </pc:sldChg>
+      <pc:sldChg chg="modSp mod">
+        <pc:chgData name="Mohammed Fasha" userId="cc64f42d-a1a6-4f08-b97b-0c37f877119f" providerId="ADAL" clId="{77FC6523-4817-446C-9BC9-1C2BFBBFCCF3}" dt="2024-08-01T14:13:52.398" v="15" actId="207"/>
+        <pc:sldMkLst>
+          <pc:docMk/>
+          <pc:sldMk cId="2557217836" sldId="497"/>
+        </pc:sldMkLst>
+        <pc:spChg chg="mod">
+          <ac:chgData name="Mohammed Fasha" userId="cc64f42d-a1a6-4f08-b97b-0c37f877119f" providerId="ADAL" clId="{77FC6523-4817-446C-9BC9-1C2BFBBFCCF3}" dt="2024-08-01T14:13:52.398" v="15" actId="207"/>
+          <ac:spMkLst>
+            <pc:docMk/>
+            <pc:sldMk cId="2557217836" sldId="497"/>
+            <ac:spMk id="3" creationId="{76156C21-AC52-833C-E3BE-ADFDC02E22E3}"/>
+          </ac:spMkLst>
+        </pc:spChg>
+      </pc:sldChg>
+      <pc:sldChg chg="new add del">
+        <pc:chgData name="Mohammed Fasha" userId="cc64f42d-a1a6-4f08-b97b-0c37f877119f" providerId="ADAL" clId="{77FC6523-4817-446C-9BC9-1C2BFBBFCCF3}" dt="2024-08-01T14:12:45.264" v="11" actId="680"/>
+        <pc:sldMkLst>
+          <pc:docMk/>
+          <pc:sldMk cId="3480950165" sldId="498"/>
+        </pc:sldMkLst>
       </pc:sldChg>
     </pc:docChg>
   </pc:docChgLst>
@@ -420,58 +541,20 @@
     </pc:docChg>
   </pc:docChgLst>
   <pc:docChgLst>
-    <pc:chgData name="Mohammed Fasha" userId="cc64f42d-a1a6-4f08-b97b-0c37f877119f" providerId="ADAL" clId="{77FC6523-4817-446C-9BC9-1C2BFBBFCCF3}"/>
-    <pc:docChg chg="undo redo custSel addSld delSld modSld">
-      <pc:chgData name="Mohammed Fasha" userId="cc64f42d-a1a6-4f08-b97b-0c37f877119f" providerId="ADAL" clId="{77FC6523-4817-446C-9BC9-1C2BFBBFCCF3}" dt="2024-08-01T17:55:13.823" v="47" actId="27636"/>
+    <pc:chgData name="Mohammed Fasha" userId="cc64f42d-a1a6-4f08-b97b-0c37f877119f" providerId="ADAL" clId="{BDE98590-4A1E-4E73-B11E-EFF0D9E423BA}"/>
+    <pc:docChg chg="custSel addSld modSld">
+      <pc:chgData name="Mohammed Fasha" userId="cc64f42d-a1a6-4f08-b97b-0c37f877119f" providerId="ADAL" clId="{BDE98590-4A1E-4E73-B11E-EFF0D9E423BA}" dt="2024-06-06T11:26:37.549" v="341" actId="20577"/>
       <pc:docMkLst>
         <pc:docMk/>
       </pc:docMkLst>
-      <pc:sldChg chg="modSp mod addAnim delAnim modAnim">
-        <pc:chgData name="Mohammed Fasha" userId="cc64f42d-a1a6-4f08-b97b-0c37f877119f" providerId="ADAL" clId="{77FC6523-4817-446C-9BC9-1C2BFBBFCCF3}" dt="2024-08-01T17:25:41.451" v="44" actId="20577"/>
-        <pc:sldMkLst>
-          <pc:docMk/>
-          <pc:sldMk cId="0" sldId="314"/>
-        </pc:sldMkLst>
-        <pc:spChg chg="mod">
-          <ac:chgData name="Mohammed Fasha" userId="cc64f42d-a1a6-4f08-b97b-0c37f877119f" providerId="ADAL" clId="{77FC6523-4817-446C-9BC9-1C2BFBBFCCF3}" dt="2024-08-01T17:25:41.451" v="44" actId="20577"/>
-          <ac:spMkLst>
-            <pc:docMk/>
-            <pc:sldMk cId="0" sldId="314"/>
-            <ac:spMk id="4" creationId="{BA94330F-87D3-D59A-DDC7-1C7D3D7F1088}"/>
-          </ac:spMkLst>
-        </pc:spChg>
-        <pc:spChg chg="mod">
-          <ac:chgData name="Mohammed Fasha" userId="cc64f42d-a1a6-4f08-b97b-0c37f877119f" providerId="ADAL" clId="{77FC6523-4817-446C-9BC9-1C2BFBBFCCF3}" dt="2024-08-01T17:24:21.461" v="30" actId="20577"/>
-          <ac:spMkLst>
-            <pc:docMk/>
-            <pc:sldMk cId="0" sldId="314"/>
-            <ac:spMk id="697" creationId="{00000000-0000-0000-0000-000000000000}"/>
-          </ac:spMkLst>
-        </pc:spChg>
-      </pc:sldChg>
       <pc:sldChg chg="modSp mod">
-        <pc:chgData name="Mohammed Fasha" userId="cc64f42d-a1a6-4f08-b97b-0c37f877119f" providerId="ADAL" clId="{77FC6523-4817-446C-9BC9-1C2BFBBFCCF3}" dt="2024-08-01T15:57:21.230" v="17" actId="14100"/>
-        <pc:sldMkLst>
-          <pc:docMk/>
-          <pc:sldMk cId="3601872685" sldId="382"/>
-        </pc:sldMkLst>
-        <pc:spChg chg="mod">
-          <ac:chgData name="Mohammed Fasha" userId="cc64f42d-a1a6-4f08-b97b-0c37f877119f" providerId="ADAL" clId="{77FC6523-4817-446C-9BC9-1C2BFBBFCCF3}" dt="2024-08-01T15:57:21.230" v="17" actId="14100"/>
-          <ac:spMkLst>
-            <pc:docMk/>
-            <pc:sldMk cId="3601872685" sldId="382"/>
-            <ac:spMk id="3" creationId="{77EB58A6-2F03-515D-C718-52C20ECDCE80}"/>
-          </ac:spMkLst>
-        </pc:spChg>
-      </pc:sldChg>
-      <pc:sldChg chg="modSp mod">
-        <pc:chgData name="Mohammed Fasha" userId="cc64f42d-a1a6-4f08-b97b-0c37f877119f" providerId="ADAL" clId="{77FC6523-4817-446C-9BC9-1C2BFBBFCCF3}" dt="2024-08-01T14:14:13.157" v="16" actId="108"/>
+        <pc:chgData name="Mohammed Fasha" userId="cc64f42d-a1a6-4f08-b97b-0c37f877119f" providerId="ADAL" clId="{BDE98590-4A1E-4E73-B11E-EFF0D9E423BA}" dt="2024-06-06T11:26:37.549" v="341" actId="20577"/>
         <pc:sldMkLst>
           <pc:docMk/>
           <pc:sldMk cId="2976191511" sldId="393"/>
         </pc:sldMkLst>
         <pc:spChg chg="mod">
-          <ac:chgData name="Mohammed Fasha" userId="cc64f42d-a1a6-4f08-b97b-0c37f877119f" providerId="ADAL" clId="{77FC6523-4817-446C-9BC9-1C2BFBBFCCF3}" dt="2024-08-01T14:14:13.157" v="16" actId="108"/>
+          <ac:chgData name="Mohammed Fasha" userId="cc64f42d-a1a6-4f08-b97b-0c37f877119f" providerId="ADAL" clId="{BDE98590-4A1E-4E73-B11E-EFF0D9E423BA}" dt="2024-06-06T11:26:37.549" v="341" actId="20577"/>
           <ac:spMkLst>
             <pc:docMk/>
             <pc:sldMk cId="2976191511" sldId="393"/>
@@ -479,117 +562,36 @@
           </ac:spMkLst>
         </pc:spChg>
       </pc:sldChg>
-      <pc:sldChg chg="modSp mod">
-        <pc:chgData name="Mohammed Fasha" userId="cc64f42d-a1a6-4f08-b97b-0c37f877119f" providerId="ADAL" clId="{77FC6523-4817-446C-9BC9-1C2BFBBFCCF3}" dt="2024-08-01T17:19:54.193" v="22" actId="368"/>
+      <pc:sldChg chg="addSp delSp modSp new mod modClrScheme chgLayout">
+        <pc:chgData name="Mohammed Fasha" userId="cc64f42d-a1a6-4f08-b97b-0c37f877119f" providerId="ADAL" clId="{BDE98590-4A1E-4E73-B11E-EFF0D9E423BA}" dt="2024-05-18T14:50:18.046" v="6" actId="1076"/>
         <pc:sldMkLst>
           <pc:docMk/>
-          <pc:sldMk cId="430192280" sldId="409"/>
+          <pc:sldMk cId="1501311303" sldId="496"/>
         </pc:sldMkLst>
-        <pc:graphicFrameChg chg="mod modGraphic">
-          <ac:chgData name="Mohammed Fasha" userId="cc64f42d-a1a6-4f08-b97b-0c37f877119f" providerId="ADAL" clId="{77FC6523-4817-446C-9BC9-1C2BFBBFCCF3}" dt="2024-08-01T17:19:54.193" v="22" actId="368"/>
-          <ac:graphicFrameMkLst>
-            <pc:docMk/>
-            <pc:sldMk cId="430192280" sldId="409"/>
-            <ac:graphicFrameMk id="9" creationId="{9DEE3332-499A-311D-04F4-37830CAB9068}"/>
-          </ac:graphicFrameMkLst>
-        </pc:graphicFrameChg>
-      </pc:sldChg>
-      <pc:sldChg chg="modSp mod">
-        <pc:chgData name="Mohammed Fasha" userId="cc64f42d-a1a6-4f08-b97b-0c37f877119f" providerId="ADAL" clId="{77FC6523-4817-446C-9BC9-1C2BFBBFCCF3}" dt="2024-08-01T17:31:03.307" v="45" actId="14100"/>
-        <pc:sldMkLst>
-          <pc:docMk/>
-          <pc:sldMk cId="465427976" sldId="414"/>
-        </pc:sldMkLst>
-        <pc:spChg chg="mod">
-          <ac:chgData name="Mohammed Fasha" userId="cc64f42d-a1a6-4f08-b97b-0c37f877119f" providerId="ADAL" clId="{77FC6523-4817-446C-9BC9-1C2BFBBFCCF3}" dt="2024-08-01T17:31:03.307" v="45" actId="14100"/>
+        <pc:spChg chg="del">
+          <ac:chgData name="Mohammed Fasha" userId="cc64f42d-a1a6-4f08-b97b-0c37f877119f" providerId="ADAL" clId="{BDE98590-4A1E-4E73-B11E-EFF0D9E423BA}" dt="2024-05-18T14:50:10.938" v="2" actId="700"/>
           <ac:spMkLst>
             <pc:docMk/>
-            <pc:sldMk cId="465427976" sldId="414"/>
-            <ac:spMk id="3" creationId="{D9658A8B-F579-1261-700D-9D318271C09F}"/>
+            <pc:sldMk cId="1501311303" sldId="496"/>
+            <ac:spMk id="2" creationId="{D2CEE17A-DDA4-0B5C-B50D-889970C3AE9A}"/>
           </ac:spMkLst>
         </pc:spChg>
-      </pc:sldChg>
-      <pc:sldChg chg="modSp mod">
-        <pc:chgData name="Mohammed Fasha" userId="cc64f42d-a1a6-4f08-b97b-0c37f877119f" providerId="ADAL" clId="{77FC6523-4817-446C-9BC9-1C2BFBBFCCF3}" dt="2024-08-01T17:20:06.764" v="26"/>
-        <pc:sldMkLst>
-          <pc:docMk/>
-          <pc:sldMk cId="707737036" sldId="425"/>
-        </pc:sldMkLst>
-        <pc:graphicFrameChg chg="mod modGraphic">
-          <ac:chgData name="Mohammed Fasha" userId="cc64f42d-a1a6-4f08-b97b-0c37f877119f" providerId="ADAL" clId="{77FC6523-4817-446C-9BC9-1C2BFBBFCCF3}" dt="2024-08-01T17:20:06.764" v="26"/>
-          <ac:graphicFrameMkLst>
-            <pc:docMk/>
-            <pc:sldMk cId="707737036" sldId="425"/>
-            <ac:graphicFrameMk id="9" creationId="{9DEE3332-499A-311D-04F4-37830CAB9068}"/>
-          </ac:graphicFrameMkLst>
-        </pc:graphicFrameChg>
-      </pc:sldChg>
-      <pc:sldChg chg="modSp mod">
-        <pc:chgData name="Mohammed Fasha" userId="cc64f42d-a1a6-4f08-b97b-0c37f877119f" providerId="ADAL" clId="{77FC6523-4817-446C-9BC9-1C2BFBBFCCF3}" dt="2024-08-01T14:12:43.227" v="9" actId="20577"/>
-        <pc:sldMkLst>
-          <pc:docMk/>
-          <pc:sldMk cId="1932795151" sldId="448"/>
-        </pc:sldMkLst>
-        <pc:spChg chg="mod">
-          <ac:chgData name="Mohammed Fasha" userId="cc64f42d-a1a6-4f08-b97b-0c37f877119f" providerId="ADAL" clId="{77FC6523-4817-446C-9BC9-1C2BFBBFCCF3}" dt="2024-08-01T14:12:43.227" v="9" actId="20577"/>
+        <pc:spChg chg="del">
+          <ac:chgData name="Mohammed Fasha" userId="cc64f42d-a1a6-4f08-b97b-0c37f877119f" providerId="ADAL" clId="{BDE98590-4A1E-4E73-B11E-EFF0D9E423BA}" dt="2024-05-18T14:50:05.577" v="1"/>
           <ac:spMkLst>
             <pc:docMk/>
-            <pc:sldMk cId="1932795151" sldId="448"/>
-            <ac:spMk id="3" creationId="{A8F66757-FC39-022C-4F62-C5EAEB601945}"/>
+            <pc:sldMk cId="1501311303" sldId="496"/>
+            <ac:spMk id="3" creationId="{E4FD7E05-4330-DB34-2C71-CB36AF65F804}"/>
           </ac:spMkLst>
         </pc:spChg>
-      </pc:sldChg>
-      <pc:sldChg chg="modSp mod">
-        <pc:chgData name="Mohammed Fasha" userId="cc64f42d-a1a6-4f08-b97b-0c37f877119f" providerId="ADAL" clId="{77FC6523-4817-446C-9BC9-1C2BFBBFCCF3}" dt="2024-08-01T17:55:13.823" v="47" actId="27636"/>
-        <pc:sldMkLst>
-          <pc:docMk/>
-          <pc:sldMk cId="673932695" sldId="492"/>
-        </pc:sldMkLst>
-        <pc:spChg chg="mod">
-          <ac:chgData name="Mohammed Fasha" userId="cc64f42d-a1a6-4f08-b97b-0c37f877119f" providerId="ADAL" clId="{77FC6523-4817-446C-9BC9-1C2BFBBFCCF3}" dt="2024-08-01T17:55:13.823" v="47" actId="27636"/>
-          <ac:spMkLst>
+        <pc:picChg chg="add mod ord">
+          <ac:chgData name="Mohammed Fasha" userId="cc64f42d-a1a6-4f08-b97b-0c37f877119f" providerId="ADAL" clId="{BDE98590-4A1E-4E73-B11E-EFF0D9E423BA}" dt="2024-05-18T14:50:18.046" v="6" actId="1076"/>
+          <ac:picMkLst>
             <pc:docMk/>
-            <pc:sldMk cId="673932695" sldId="492"/>
-            <ac:spMk id="9" creationId="{07B00AAE-435B-F125-45F0-2514F51DC8D1}"/>
-          </ac:spMkLst>
-        </pc:spChg>
-      </pc:sldChg>
-      <pc:sldChg chg="modSp mod">
-        <pc:chgData name="Mohammed Fasha" userId="cc64f42d-a1a6-4f08-b97b-0c37f877119f" providerId="ADAL" clId="{77FC6523-4817-446C-9BC9-1C2BFBBFCCF3}" dt="2024-08-01T15:57:54.799" v="18" actId="207"/>
-        <pc:sldMkLst>
-          <pc:docMk/>
-          <pc:sldMk cId="2512069021" sldId="493"/>
-        </pc:sldMkLst>
-        <pc:spChg chg="mod">
-          <ac:chgData name="Mohammed Fasha" userId="cc64f42d-a1a6-4f08-b97b-0c37f877119f" providerId="ADAL" clId="{77FC6523-4817-446C-9BC9-1C2BFBBFCCF3}" dt="2024-08-01T15:57:54.799" v="18" actId="207"/>
-          <ac:spMkLst>
-            <pc:docMk/>
-            <pc:sldMk cId="2512069021" sldId="493"/>
-            <ac:spMk id="2" creationId="{DE8DB31A-FBF2-693E-DC7B-90969B148559}"/>
-          </ac:spMkLst>
-        </pc:spChg>
-      </pc:sldChg>
-      <pc:sldChg chg="modSp mod">
-        <pc:chgData name="Mohammed Fasha" userId="cc64f42d-a1a6-4f08-b97b-0c37f877119f" providerId="ADAL" clId="{77FC6523-4817-446C-9BC9-1C2BFBBFCCF3}" dt="2024-08-01T14:13:52.398" v="15" actId="207"/>
-        <pc:sldMkLst>
-          <pc:docMk/>
-          <pc:sldMk cId="2557217836" sldId="497"/>
-        </pc:sldMkLst>
-        <pc:spChg chg="mod">
-          <ac:chgData name="Mohammed Fasha" userId="cc64f42d-a1a6-4f08-b97b-0c37f877119f" providerId="ADAL" clId="{77FC6523-4817-446C-9BC9-1C2BFBBFCCF3}" dt="2024-08-01T14:13:52.398" v="15" actId="207"/>
-          <ac:spMkLst>
-            <pc:docMk/>
-            <pc:sldMk cId="2557217836" sldId="497"/>
-            <ac:spMk id="3" creationId="{76156C21-AC52-833C-E3BE-ADFDC02E22E3}"/>
-          </ac:spMkLst>
-        </pc:spChg>
-      </pc:sldChg>
-      <pc:sldChg chg="new add del">
-        <pc:chgData name="Mohammed Fasha" userId="cc64f42d-a1a6-4f08-b97b-0c37f877119f" providerId="ADAL" clId="{77FC6523-4817-446C-9BC9-1C2BFBBFCCF3}" dt="2024-08-01T14:12:45.264" v="11" actId="680"/>
-        <pc:sldMkLst>
-          <pc:docMk/>
-          <pc:sldMk cId="3480950165" sldId="498"/>
-        </pc:sldMkLst>
+            <pc:sldMk cId="1501311303" sldId="496"/>
+            <ac:picMk id="4" creationId="{F876EE48-736B-0B05-3579-CE389267CB37}"/>
+          </ac:picMkLst>
+        </pc:picChg>
       </pc:sldChg>
     </pc:docChg>
   </pc:docChgLst>
@@ -4533,7 +4535,7 @@
           <p:cNvPr id="2" name="Title 1">
             <a:extLst>
               <a:ext uri="{FF2B5EF4-FFF2-40B4-BE49-F238E27FC236}">
-                <a16:creationId xmlns:a16="http://schemas.microsoft.com/office/drawing/2014/main" id="{3C416429-38CE-91F0-3778-72E031A8CB75}"/>
+                <a16:creationId xmlns:a16="http://schemas.microsoft.com/office/drawing/2014/main" id="{BB65DFA5-1BF5-6812-0FC6-37B4CE03EB8B}"/>
               </a:ext>
             </a:extLst>
           </p:cNvPr>
@@ -4549,7 +4551,10 @@
           <a:bodyPr/>
           <a:lstStyle/>
           <a:p>
-            <a:endParaRPr lang="en-US"/>
+            <a:r>
+              <a:rPr lang="en-US" dirty="0"/>
+              <a:t>Language AI</a:t>
+            </a:r>
           </a:p>
         </p:txBody>
       </p:sp>
@@ -4558,7 +4563,7 @@
           <p:cNvPr id="3" name="Content Placeholder 2">
             <a:extLst>
               <a:ext uri="{FF2B5EF4-FFF2-40B4-BE49-F238E27FC236}">
-                <a16:creationId xmlns:a16="http://schemas.microsoft.com/office/drawing/2014/main" id="{7B82C5EB-05BA-027B-CE2A-4B5A321448AF}"/>
+                <a16:creationId xmlns:a16="http://schemas.microsoft.com/office/drawing/2014/main" id="{955C825C-6F88-A7DC-B380-8F17C7E88B4E}"/>
               </a:ext>
             </a:extLst>
           </p:cNvPr>
@@ -4571,17 +4576,46 @@
         </p:nvSpPr>
         <p:spPr/>
         <p:txBody>
-          <a:bodyPr/>
+          <a:bodyPr>
+            <a:normAutofit/>
+          </a:bodyPr>
           <a:lstStyle/>
           <a:p>
-            <a:endParaRPr lang="en-US"/>
+            <a:pPr marL="228600" lvl="1"/>
+            <a:r>
+              <a:rPr lang="en-US" sz="2400" b="0" u="none" strike="noStrike" baseline="0" dirty="0">
+                <a:latin typeface="Calibri (Body)"/>
+                <a:cs typeface="Times New Roman" panose="02020603050405020304" pitchFamily="18" charset="0"/>
+              </a:rPr>
+              <a:t>Language AI refers to a subfield of AI that focuses on developing technologies capable of understanding, processing, and generating human language. </a:t>
+            </a:r>
+          </a:p>
+          <a:p>
+            <a:pPr marL="228600" lvl="1"/>
+            <a:r>
+              <a:rPr lang="en-US" sz="2400" b="0" u="none" strike="noStrike" baseline="0" dirty="0">
+                <a:latin typeface="Calibri (Body)"/>
+                <a:cs typeface="Times New Roman" panose="02020603050405020304" pitchFamily="18" charset="0"/>
+              </a:rPr>
+              <a:t>The term Language AI can often be used interchangeably with natural language processing (NLP) with the continued success of machine learning methods in tackling language processing problems.</a:t>
+            </a:r>
+          </a:p>
+          <a:p>
+            <a:pPr marL="228600" lvl="1"/>
+            <a:r>
+              <a:rPr lang="en-US" sz="2400" b="0" u="none" strike="noStrike" baseline="0" dirty="0">
+                <a:latin typeface="Calibri (Body)"/>
+                <a:cs typeface="Times New Roman" panose="02020603050405020304" pitchFamily="18" charset="0"/>
+              </a:rPr>
+              <a:t>Language is a tricky concept for computers. Text is unstructured in nature and loses its meaning when represented by zeros and ones (individual characters). </a:t>
+            </a:r>
           </a:p>
         </p:txBody>
       </p:sp>
     </p:spTree>
     <p:extLst>
       <p:ext uri="{BB962C8B-B14F-4D97-AF65-F5344CB8AC3E}">
-        <p14:creationId xmlns:p14="http://schemas.microsoft.com/office/powerpoint/2010/main" val="611058483"/>
+        <p14:creationId xmlns:p14="http://schemas.microsoft.com/office/powerpoint/2010/main" val="266518897"/>
       </p:ext>
     </p:extLst>
   </p:cSld>
@@ -4596,13 +4630,7 @@
   <p:cSld>
     <p:spTree>
       <p:nvGrpSpPr>
-        <p:cNvPr id="1" name="">
-          <a:extLst>
-            <a:ext uri="{FF2B5EF4-FFF2-40B4-BE49-F238E27FC236}">
-              <a16:creationId xmlns:a16="http://schemas.microsoft.com/office/drawing/2014/main" id="{D19DD1A4-456B-E194-4128-733385B9ECDD}"/>
-            </a:ext>
-          </a:extLst>
-        </p:cNvPr>
+        <p:cNvPr id="1" name=""/>
         <p:cNvGrpSpPr/>
         <p:nvPr/>
       </p:nvGrpSpPr>
@@ -4619,7 +4647,7 @@
           <p:cNvPr id="2" name="Title 1">
             <a:extLst>
               <a:ext uri="{FF2B5EF4-FFF2-40B4-BE49-F238E27FC236}">
-                <a16:creationId xmlns:a16="http://schemas.microsoft.com/office/drawing/2014/main" id="{608F5E7A-D316-AFAF-E95C-6EC650DDEA60}"/>
+                <a16:creationId xmlns:a16="http://schemas.microsoft.com/office/drawing/2014/main" id="{0CC2CE8F-70F8-320A-C5D5-B8F7B48BA38D}"/>
               </a:ext>
             </a:extLst>
           </p:cNvPr>
@@ -4635,7 +4663,10 @@
           <a:bodyPr/>
           <a:lstStyle/>
           <a:p>
-            <a:endParaRPr lang="en-US"/>
+            <a:r>
+              <a:rPr lang="en-US" dirty="0"/>
+              <a:t>A Recent History of Language AI</a:t>
+            </a:r>
           </a:p>
         </p:txBody>
       </p:sp>
@@ -4644,7 +4675,7 @@
           <p:cNvPr id="3" name="Content Placeholder 2">
             <a:extLst>
               <a:ext uri="{FF2B5EF4-FFF2-40B4-BE49-F238E27FC236}">
-                <a16:creationId xmlns:a16="http://schemas.microsoft.com/office/drawing/2014/main" id="{7697C599-9EF2-CCC4-B84A-6393C86D166D}"/>
+                <a16:creationId xmlns:a16="http://schemas.microsoft.com/office/drawing/2014/main" id="{CE4689E8-2F36-16ED-07ED-24F170B48E5C}"/>
               </a:ext>
             </a:extLst>
           </p:cNvPr>
@@ -4660,14 +4691,47 @@
           <a:bodyPr/>
           <a:lstStyle/>
           <a:p>
-            <a:endParaRPr lang="en-US"/>
-          </a:p>
-        </p:txBody>
-      </p:sp>
+            <a:r>
+              <a:rPr lang="en-US" dirty="0"/>
+              <a:t>As a result, throughout the history of Language AI, there has been a large focus on representing language in a structured manner so that it can more easily be used by computers.</a:t>
+            </a:r>
+          </a:p>
+        </p:txBody>
+      </p:sp>
+      <p:pic>
+        <p:nvPicPr>
+          <p:cNvPr id="5" name="Picture 4">
+            <a:extLst>
+              <a:ext uri="{FF2B5EF4-FFF2-40B4-BE49-F238E27FC236}">
+                <a16:creationId xmlns:a16="http://schemas.microsoft.com/office/drawing/2014/main" id="{F9F3063B-4C77-BECF-ABFF-EAF8A3B8F528}"/>
+              </a:ext>
+            </a:extLst>
+          </p:cNvPr>
+          <p:cNvPicPr>
+            <a:picLocks noChangeAspect="1"/>
+          </p:cNvPicPr>
+          <p:nvPr/>
+        </p:nvPicPr>
+        <p:blipFill>
+          <a:blip r:embed="rId2"/>
+          <a:stretch>
+            <a:fillRect/>
+          </a:stretch>
+        </p:blipFill>
+        <p:spPr>
+          <a:xfrm>
+            <a:off x="2718848" y="3552987"/>
+            <a:ext cx="6754303" cy="2881836"/>
+          </a:xfrm>
+          <a:prstGeom prst="rect">
+            <a:avLst/>
+          </a:prstGeom>
+        </p:spPr>
+      </p:pic>
     </p:spTree>
     <p:extLst>
       <p:ext uri="{BB962C8B-B14F-4D97-AF65-F5344CB8AC3E}">
-        <p14:creationId xmlns:p14="http://schemas.microsoft.com/office/powerpoint/2010/main" val="2133492739"/>
+        <p14:creationId xmlns:p14="http://schemas.microsoft.com/office/powerpoint/2010/main" val="850373043"/>
       </p:ext>
     </p:extLst>
   </p:cSld>
@@ -4682,13 +4746,7 @@
   <p:cSld>
     <p:spTree>
       <p:nvGrpSpPr>
-        <p:cNvPr id="1" name="">
-          <a:extLst>
-            <a:ext uri="{FF2B5EF4-FFF2-40B4-BE49-F238E27FC236}">
-              <a16:creationId xmlns:a16="http://schemas.microsoft.com/office/drawing/2014/main" id="{07BC96BB-2A04-0084-5050-F421993FA7C5}"/>
-            </a:ext>
-          </a:extLst>
-        </p:cNvPr>
+        <p:cNvPr id="1" name=""/>
         <p:cNvGrpSpPr/>
         <p:nvPr/>
       </p:nvGrpSpPr>
@@ -4705,7 +4763,7 @@
           <p:cNvPr id="2" name="Title 1">
             <a:extLst>
               <a:ext uri="{FF2B5EF4-FFF2-40B4-BE49-F238E27FC236}">
-                <a16:creationId xmlns:a16="http://schemas.microsoft.com/office/drawing/2014/main" id="{EBE95F06-8F27-B440-1B57-B0EC9CE91073}"/>
+                <a16:creationId xmlns:a16="http://schemas.microsoft.com/office/drawing/2014/main" id="{1A18591C-2FB8-BA78-AAC0-9A154AD3B66D}"/>
               </a:ext>
             </a:extLst>
           </p:cNvPr>
@@ -4721,7 +4779,10 @@
           <a:bodyPr/>
           <a:lstStyle/>
           <a:p>
-            <a:endParaRPr lang="en-US"/>
+            <a:r>
+              <a:rPr lang="en-US" dirty="0"/>
+              <a:t>Bag of Words</a:t>
+            </a:r>
           </a:p>
         </p:txBody>
       </p:sp>
@@ -4730,7 +4791,7 @@
           <p:cNvPr id="3" name="Content Placeholder 2">
             <a:extLst>
               <a:ext uri="{FF2B5EF4-FFF2-40B4-BE49-F238E27FC236}">
-                <a16:creationId xmlns:a16="http://schemas.microsoft.com/office/drawing/2014/main" id="{66210E79-A48C-C9EE-6CE3-EAD21128EC7B}"/>
+                <a16:creationId xmlns:a16="http://schemas.microsoft.com/office/drawing/2014/main" id="{682C153D-56EF-27EA-C3FC-B51436E8F1E2}"/>
               </a:ext>
             </a:extLst>
           </p:cNvPr>
@@ -4741,19 +4802,79 @@
             <p:ph idx="1"/>
           </p:nvPr>
         </p:nvSpPr>
-        <p:spPr/>
-        <p:txBody>
-          <a:bodyPr/>
+        <p:spPr>
+          <a:xfrm>
+            <a:off x="838200" y="1706008"/>
+            <a:ext cx="10515600" cy="2943484"/>
+          </a:xfrm>
+        </p:spPr>
+        <p:txBody>
+          <a:bodyPr>
+            <a:normAutofit/>
+          </a:bodyPr>
           <a:lstStyle/>
           <a:p>
-            <a:endParaRPr lang="en-US"/>
-          </a:p>
-        </p:txBody>
-      </p:sp>
+            <a:r>
+              <a:rPr lang="en-US" dirty="0"/>
+              <a:t>bag-of-words is an old method for representing unstructured text.2 It was first mentioned around the 1950s but became popular around the 2000s.</a:t>
+            </a:r>
+          </a:p>
+          <a:p>
+            <a:r>
+              <a:rPr lang="en-US" dirty="0"/>
+              <a:t>Bag-of-words works as follows: let’s assume that we have two sentences for which we want to create numerical representations. </a:t>
+            </a:r>
+          </a:p>
+          <a:p>
+            <a:r>
+              <a:rPr lang="en-US" dirty="0"/>
+              <a:t>The first step of the bag-of-words model is tokenization, the process of splitting up the sentences into individual words or </a:t>
+            </a:r>
+            <a:r>
+              <a:rPr lang="en-US" dirty="0" err="1"/>
+              <a:t>subwords</a:t>
+            </a:r>
+            <a:r>
+              <a:rPr lang="en-US" dirty="0"/>
+              <a:t> (tokens), as illustrated in figure below.</a:t>
+            </a:r>
+          </a:p>
+        </p:txBody>
+      </p:sp>
+      <p:pic>
+        <p:nvPicPr>
+          <p:cNvPr id="5" name="Picture 4">
+            <a:extLst>
+              <a:ext uri="{FF2B5EF4-FFF2-40B4-BE49-F238E27FC236}">
+                <a16:creationId xmlns:a16="http://schemas.microsoft.com/office/drawing/2014/main" id="{A71BD325-2823-D105-5B9C-280FB27036C9}"/>
+              </a:ext>
+            </a:extLst>
+          </p:cNvPr>
+          <p:cNvPicPr>
+            <a:picLocks noChangeAspect="1"/>
+          </p:cNvPicPr>
+          <p:nvPr/>
+        </p:nvPicPr>
+        <p:blipFill>
+          <a:blip r:embed="rId2"/>
+          <a:stretch>
+            <a:fillRect/>
+          </a:stretch>
+        </p:blipFill>
+        <p:spPr>
+          <a:xfrm>
+            <a:off x="3379960" y="4809769"/>
+            <a:ext cx="5432079" cy="1828800"/>
+          </a:xfrm>
+          <a:prstGeom prst="rect">
+            <a:avLst/>
+          </a:prstGeom>
+        </p:spPr>
+      </p:pic>
     </p:spTree>
     <p:extLst>
       <p:ext uri="{BB962C8B-B14F-4D97-AF65-F5344CB8AC3E}">
-        <p14:creationId xmlns:p14="http://schemas.microsoft.com/office/powerpoint/2010/main" val="161865457"/>
+        <p14:creationId xmlns:p14="http://schemas.microsoft.com/office/powerpoint/2010/main" val="1194361743"/>
       </p:ext>
     </p:extLst>
   </p:cSld>
@@ -4768,13 +4889,7 @@
   <p:cSld>
     <p:spTree>
       <p:nvGrpSpPr>
-        <p:cNvPr id="1" name="">
-          <a:extLst>
-            <a:ext uri="{FF2B5EF4-FFF2-40B4-BE49-F238E27FC236}">
-              <a16:creationId xmlns:a16="http://schemas.microsoft.com/office/drawing/2014/main" id="{70A9405F-D4AB-9421-75FE-F5B65D57FABF}"/>
-            </a:ext>
-          </a:extLst>
-        </p:cNvPr>
+        <p:cNvPr id="1" name=""/>
         <p:cNvGrpSpPr/>
         <p:nvPr/>
       </p:nvGrpSpPr>
@@ -4791,7 +4906,7 @@
           <p:cNvPr id="2" name="Title 1">
             <a:extLst>
               <a:ext uri="{FF2B5EF4-FFF2-40B4-BE49-F238E27FC236}">
-                <a16:creationId xmlns:a16="http://schemas.microsoft.com/office/drawing/2014/main" id="{130971DB-688D-8C3D-4C13-B5AF90E7DBDD}"/>
+                <a16:creationId xmlns:a16="http://schemas.microsoft.com/office/drawing/2014/main" id="{E42103B1-CB1F-1DEF-3F83-02C3B5C5AFE4}"/>
               </a:ext>
             </a:extLst>
           </p:cNvPr>
@@ -4807,7 +4922,10 @@
           <a:bodyPr/>
           <a:lstStyle/>
           <a:p>
-            <a:endParaRPr lang="en-US"/>
+            <a:r>
+              <a:rPr lang="en-US" dirty="0"/>
+              <a:t>Bag of Words</a:t>
+            </a:r>
           </a:p>
         </p:txBody>
       </p:sp>
@@ -4816,7 +4934,7 @@
           <p:cNvPr id="3" name="Content Placeholder 2">
             <a:extLst>
               <a:ext uri="{FF2B5EF4-FFF2-40B4-BE49-F238E27FC236}">
-                <a16:creationId xmlns:a16="http://schemas.microsoft.com/office/drawing/2014/main" id="{0B5B33C6-D7ED-055D-F4E1-7EFA7EFB0CFE}"/>
+                <a16:creationId xmlns:a16="http://schemas.microsoft.com/office/drawing/2014/main" id="{283AEAF6-16E3-EFAA-3C98-800711506102}"/>
               </a:ext>
             </a:extLst>
           </p:cNvPr>
@@ -4827,19 +4945,272 @@
             <p:ph idx="1"/>
           </p:nvPr>
         </p:nvSpPr>
-        <p:spPr/>
+        <p:spPr>
+          <a:xfrm>
+            <a:off x="838200" y="1706007"/>
+            <a:ext cx="10515600" cy="1582883"/>
+          </a:xfrm>
+        </p:spPr>
         <p:txBody>
           <a:bodyPr/>
           <a:lstStyle/>
           <a:p>
-            <a:endParaRPr lang="en-US"/>
-          </a:p>
-        </p:txBody>
-      </p:sp>
+            <a:r>
+              <a:rPr lang="en-US" dirty="0"/>
+              <a:t>After tokenization, we combine all unique words from each sentence to create a </a:t>
+            </a:r>
+            <a:r>
+              <a:rPr lang="en-US" b="1" dirty="0"/>
+              <a:t>vocabulary</a:t>
+            </a:r>
+            <a:r>
+              <a:rPr lang="en-US" dirty="0"/>
+              <a:t> that we can use to represent the sentences.</a:t>
+            </a:r>
+          </a:p>
+        </p:txBody>
+      </p:sp>
+      <p:pic>
+        <p:nvPicPr>
+          <p:cNvPr id="5" name="Picture 4">
+            <a:extLst>
+              <a:ext uri="{FF2B5EF4-FFF2-40B4-BE49-F238E27FC236}">
+                <a16:creationId xmlns:a16="http://schemas.microsoft.com/office/drawing/2014/main" id="{E75A2256-0C69-9617-7452-6EB180214D16}"/>
+              </a:ext>
+            </a:extLst>
+          </p:cNvPr>
+          <p:cNvPicPr>
+            <a:picLocks noChangeAspect="1"/>
+          </p:cNvPicPr>
+          <p:nvPr/>
+        </p:nvPicPr>
+        <p:blipFill>
+          <a:blip r:embed="rId2"/>
+          <a:stretch>
+            <a:fillRect/>
+          </a:stretch>
+        </p:blipFill>
+        <p:spPr>
+          <a:xfrm>
+            <a:off x="3379960" y="3613356"/>
+            <a:ext cx="5432079" cy="2679826"/>
+          </a:xfrm>
+          <a:prstGeom prst="rect">
+            <a:avLst/>
+          </a:prstGeom>
+        </p:spPr>
+      </p:pic>
     </p:spTree>
     <p:extLst>
       <p:ext uri="{BB962C8B-B14F-4D97-AF65-F5344CB8AC3E}">
-        <p14:creationId xmlns:p14="http://schemas.microsoft.com/office/powerpoint/2010/main" val="2454435890"/>
+        <p14:creationId xmlns:p14="http://schemas.microsoft.com/office/powerpoint/2010/main" val="2670969864"/>
+      </p:ext>
+    </p:extLst>
+  </p:cSld>
+  <p:clrMapOvr>
+    <a:masterClrMapping/>
+  </p:clrMapOvr>
+</p:sld>
+</file>
+
+<file path=ppt/slides/slide6.xml><?xml version="1.0" encoding="utf-8"?>
+<p:sld xmlns:a="http://schemas.openxmlformats.org/drawingml/2006/main" xmlns:r="http://schemas.openxmlformats.org/officeDocument/2006/relationships" xmlns:p="http://schemas.openxmlformats.org/presentationml/2006/main">
+  <p:cSld>
+    <p:spTree>
+      <p:nvGrpSpPr>
+        <p:cNvPr id="1" name=""/>
+        <p:cNvGrpSpPr/>
+        <p:nvPr/>
+      </p:nvGrpSpPr>
+      <p:grpSpPr>
+        <a:xfrm>
+          <a:off x="0" y="0"/>
+          <a:ext cx="0" cy="0"/>
+          <a:chOff x="0" y="0"/>
+          <a:chExt cx="0" cy="0"/>
+        </a:xfrm>
+      </p:grpSpPr>
+      <p:sp>
+        <p:nvSpPr>
+          <p:cNvPr id="2" name="Title 1">
+            <a:extLst>
+              <a:ext uri="{FF2B5EF4-FFF2-40B4-BE49-F238E27FC236}">
+                <a16:creationId xmlns:a16="http://schemas.microsoft.com/office/drawing/2014/main" id="{A98255D3-8510-5A7E-3A19-B93F66C88222}"/>
+              </a:ext>
+            </a:extLst>
+          </p:cNvPr>
+          <p:cNvSpPr>
+            <a:spLocks noGrp="1"/>
+          </p:cNvSpPr>
+          <p:nvPr>
+            <p:ph type="title"/>
+          </p:nvPr>
+        </p:nvSpPr>
+        <p:spPr/>
+        <p:txBody>
+          <a:bodyPr/>
+          <a:lstStyle/>
+          <a:p>
+            <a:r>
+              <a:rPr lang="en-US" dirty="0"/>
+              <a:t>Bag of Words</a:t>
+            </a:r>
+          </a:p>
+        </p:txBody>
+      </p:sp>
+      <p:sp>
+        <p:nvSpPr>
+          <p:cNvPr id="3" name="Content Placeholder 2">
+            <a:extLst>
+              <a:ext uri="{FF2B5EF4-FFF2-40B4-BE49-F238E27FC236}">
+                <a16:creationId xmlns:a16="http://schemas.microsoft.com/office/drawing/2014/main" id="{4ABFFC45-D081-1C27-10FD-C34043D3C30A}"/>
+              </a:ext>
+            </a:extLst>
+          </p:cNvPr>
+          <p:cNvSpPr>
+            <a:spLocks noGrp="1"/>
+          </p:cNvSpPr>
+          <p:nvPr>
+            <p:ph idx="1"/>
+          </p:nvPr>
+        </p:nvSpPr>
+        <p:spPr>
+          <a:xfrm>
+            <a:off x="838200" y="1706008"/>
+            <a:ext cx="10515600" cy="2276058"/>
+          </a:xfrm>
+        </p:spPr>
+        <p:txBody>
+          <a:bodyPr/>
+          <a:lstStyle/>
+          <a:p>
+            <a:r>
+              <a:rPr lang="en-US" dirty="0"/>
+              <a:t>Using our vocabulary, we simply count how often a word in each sentence appears, quite literally creating a bag of words. </a:t>
+            </a:r>
+          </a:p>
+          <a:p>
+            <a:r>
+              <a:rPr lang="en-US" dirty="0"/>
+              <a:t>As a result, a bag-of-words model aims to create representations of text in the form of numbers, also called vectors or vector representations, observed in the figure below.</a:t>
+            </a:r>
+          </a:p>
+        </p:txBody>
+      </p:sp>
+      <p:pic>
+        <p:nvPicPr>
+          <p:cNvPr id="5" name="Picture 4">
+            <a:extLst>
+              <a:ext uri="{FF2B5EF4-FFF2-40B4-BE49-F238E27FC236}">
+                <a16:creationId xmlns:a16="http://schemas.microsoft.com/office/drawing/2014/main" id="{15732CBB-AB27-8EB9-F873-0E0617B2C43F}"/>
+              </a:ext>
+            </a:extLst>
+          </p:cNvPr>
+          <p:cNvPicPr>
+            <a:picLocks noChangeAspect="1"/>
+          </p:cNvPicPr>
+          <p:nvPr/>
+        </p:nvPicPr>
+        <p:blipFill>
+          <a:blip r:embed="rId2"/>
+          <a:stretch>
+            <a:fillRect/>
+          </a:stretch>
+        </p:blipFill>
+        <p:spPr>
+          <a:xfrm>
+            <a:off x="2973144" y="3642611"/>
+            <a:ext cx="6245712" cy="3018761"/>
+          </a:xfrm>
+          <a:prstGeom prst="rect">
+            <a:avLst/>
+          </a:prstGeom>
+        </p:spPr>
+      </p:pic>
+    </p:spTree>
+    <p:extLst>
+      <p:ext uri="{BB962C8B-B14F-4D97-AF65-F5344CB8AC3E}">
+        <p14:creationId xmlns:p14="http://schemas.microsoft.com/office/powerpoint/2010/main" val="1716622414"/>
+      </p:ext>
+    </p:extLst>
+  </p:cSld>
+  <p:clrMapOvr>
+    <a:masterClrMapping/>
+  </p:clrMapOvr>
+</p:sld>
+</file>
+
+<file path=ppt/slides/slide7.xml><?xml version="1.0" encoding="utf-8"?>
+<p:sld xmlns:a="http://schemas.openxmlformats.org/drawingml/2006/main" xmlns:r="http://schemas.openxmlformats.org/officeDocument/2006/relationships" xmlns:p="http://schemas.openxmlformats.org/presentationml/2006/main">
+  <p:cSld>
+    <p:spTree>
+      <p:nvGrpSpPr>
+        <p:cNvPr id="1" name=""/>
+        <p:cNvGrpSpPr/>
+        <p:nvPr/>
+      </p:nvGrpSpPr>
+      <p:grpSpPr>
+        <a:xfrm>
+          <a:off x="0" y="0"/>
+          <a:ext cx="0" cy="0"/>
+          <a:chOff x="0" y="0"/>
+          <a:chExt cx="0" cy="0"/>
+        </a:xfrm>
+      </p:grpSpPr>
+      <p:sp>
+        <p:nvSpPr>
+          <p:cNvPr id="2" name="Title 1">
+            <a:extLst>
+              <a:ext uri="{FF2B5EF4-FFF2-40B4-BE49-F238E27FC236}">
+                <a16:creationId xmlns:a16="http://schemas.microsoft.com/office/drawing/2014/main" id="{20D69DEF-E2D9-9FF9-420A-84368DF3E7B4}"/>
+              </a:ext>
+            </a:extLst>
+          </p:cNvPr>
+          <p:cNvSpPr>
+            <a:spLocks noGrp="1"/>
+          </p:cNvSpPr>
+          <p:nvPr>
+            <p:ph type="title"/>
+          </p:nvPr>
+        </p:nvSpPr>
+        <p:spPr/>
+        <p:txBody>
+          <a:bodyPr/>
+          <a:lstStyle/>
+          <a:p>
+            <a:endParaRPr lang="en-US"/>
+          </a:p>
+        </p:txBody>
+      </p:sp>
+      <p:sp>
+        <p:nvSpPr>
+          <p:cNvPr id="3" name="Content Placeholder 2">
+            <a:extLst>
+              <a:ext uri="{FF2B5EF4-FFF2-40B4-BE49-F238E27FC236}">
+                <a16:creationId xmlns:a16="http://schemas.microsoft.com/office/drawing/2014/main" id="{4D976850-9C50-C374-F50B-C447AAE4F80A}"/>
+              </a:ext>
+            </a:extLst>
+          </p:cNvPr>
+          <p:cNvSpPr>
+            <a:spLocks noGrp="1"/>
+          </p:cNvSpPr>
+          <p:nvPr>
+            <p:ph idx="1"/>
+          </p:nvPr>
+        </p:nvSpPr>
+        <p:spPr/>
+        <p:txBody>
+          <a:bodyPr/>
+          <a:lstStyle/>
+          <a:p>
+            <a:endParaRPr lang="en-US"/>
+          </a:p>
+        </p:txBody>
+      </p:sp>
+    </p:spTree>
+    <p:extLst>
+      <p:ext uri="{BB962C8B-B14F-4D97-AF65-F5344CB8AC3E}">
+        <p14:creationId xmlns:p14="http://schemas.microsoft.com/office/powerpoint/2010/main" val="2848272136"/>
       </p:ext>
     </p:extLst>
   </p:cSld>

</xml_diff>